<commit_message>
First draft interfaces for LEMs
</commit_message>
<xml_diff>
--- a/documentation/LEMs.pptx
+++ b/documentation/LEMs.pptx
@@ -126,6 +126,32 @@
 </p:presentation>
 </file>
 
+<file path=ppt/commentAuthors.xml><?xml version="1.0" encoding="utf-8"?>
+<p:cmAuthorLst xmlns:a="http://schemas.openxmlformats.org/drawingml/2006/main" xmlns:r="http://schemas.openxmlformats.org/officeDocument/2006/relationships" xmlns:p="http://schemas.openxmlformats.org/presentationml/2006/main">
+  <p:cmAuthor id="1" name="David Rodriguez Aguilera" initials="DRA" lastIdx="1" clrIdx="0">
+    <p:extLst>
+      <p:ext uri="{19B8F6BF-5375-455C-9EA6-DF929625EA0E}">
+        <p15:presenceInfo xmlns:p15="http://schemas.microsoft.com/office/powerpoint/2012/main" userId="S-1-5-21-3655887099-757789289-3866496867-4458" providerId="AD"/>
+      </p:ext>
+    </p:extLst>
+  </p:cmAuthor>
+</p:cmAuthorLst>
+</file>
+
+<file path=ppt/comments/comment1.xml><?xml version="1.0" encoding="utf-8"?>
+<p:cmLst xmlns:a="http://schemas.openxmlformats.org/drawingml/2006/main" xmlns:r="http://schemas.openxmlformats.org/officeDocument/2006/relationships" xmlns:p="http://schemas.openxmlformats.org/presentationml/2006/main">
+  <p:cm authorId="1" dt="2018-02-28T10:05:43.908" idx="1">
+    <p:pos x="2165" y="2830"/>
+    <p:text>Radius / tangentValue?</p:text>
+    <p:extLst>
+      <p:ext uri="{C676402C-5697-4E1C-873F-D02D1690AC5C}">
+        <p15:threadingInfo xmlns:p15="http://schemas.microsoft.com/office/powerpoint/2012/main" timeZoneBias="-60"/>
+      </p:ext>
+    </p:extLst>
+  </p:cm>
+</p:cmLst>
+</file>
+
 <file path=ppt/slideLayouts/slideLayout1.xml><?xml version="1.0" encoding="utf-8"?>
 <p:sldLayout xmlns:a="http://schemas.openxmlformats.org/drawingml/2006/main" xmlns:r="http://schemas.openxmlformats.org/officeDocument/2006/relationships" xmlns:p="http://schemas.openxmlformats.org/presentationml/2006/main" type="title" preserve="1">
   <p:cSld name="Title Slide">
@@ -257,7 +283,7 @@
           <a:p>
             <a:fld id="{1231BFB6-14EA-4E35-8B8E-D28544ECD36E}" type="datetimeFigureOut">
               <a:rPr lang="en-US" smtClean="0"/>
-              <a:t>27-Feb-18</a:t>
+              <a:t>02-Mar-18</a:t>
             </a:fld>
             <a:endParaRPr lang="en-US"/>
           </a:p>
@@ -427,7 +453,7 @@
           <a:p>
             <a:fld id="{1231BFB6-14EA-4E35-8B8E-D28544ECD36E}" type="datetimeFigureOut">
               <a:rPr lang="en-US" smtClean="0"/>
-              <a:t>27-Feb-18</a:t>
+              <a:t>02-Mar-18</a:t>
             </a:fld>
             <a:endParaRPr lang="en-US"/>
           </a:p>
@@ -607,7 +633,7 @@
           <a:p>
             <a:fld id="{1231BFB6-14EA-4E35-8B8E-D28544ECD36E}" type="datetimeFigureOut">
               <a:rPr lang="en-US" smtClean="0"/>
-              <a:t>27-Feb-18</a:t>
+              <a:t>02-Mar-18</a:t>
             </a:fld>
             <a:endParaRPr lang="en-US"/>
           </a:p>
@@ -777,7 +803,7 @@
           <a:p>
             <a:fld id="{1231BFB6-14EA-4E35-8B8E-D28544ECD36E}" type="datetimeFigureOut">
               <a:rPr lang="en-US" smtClean="0"/>
-              <a:t>27-Feb-18</a:t>
+              <a:t>02-Mar-18</a:t>
             </a:fld>
             <a:endParaRPr lang="en-US"/>
           </a:p>
@@ -1023,7 +1049,7 @@
           <a:p>
             <a:fld id="{1231BFB6-14EA-4E35-8B8E-D28544ECD36E}" type="datetimeFigureOut">
               <a:rPr lang="en-US" smtClean="0"/>
-              <a:t>27-Feb-18</a:t>
+              <a:t>02-Mar-18</a:t>
             </a:fld>
             <a:endParaRPr lang="en-US"/>
           </a:p>
@@ -1255,7 +1281,7 @@
           <a:p>
             <a:fld id="{1231BFB6-14EA-4E35-8B8E-D28544ECD36E}" type="datetimeFigureOut">
               <a:rPr lang="en-US" smtClean="0"/>
-              <a:t>27-Feb-18</a:t>
+              <a:t>02-Mar-18</a:t>
             </a:fld>
             <a:endParaRPr lang="en-US"/>
           </a:p>
@@ -1622,7 +1648,7 @@
           <a:p>
             <a:fld id="{1231BFB6-14EA-4E35-8B8E-D28544ECD36E}" type="datetimeFigureOut">
               <a:rPr lang="en-US" smtClean="0"/>
-              <a:t>27-Feb-18</a:t>
+              <a:t>02-Mar-18</a:t>
             </a:fld>
             <a:endParaRPr lang="en-US"/>
           </a:p>
@@ -1740,7 +1766,7 @@
           <a:p>
             <a:fld id="{1231BFB6-14EA-4E35-8B8E-D28544ECD36E}" type="datetimeFigureOut">
               <a:rPr lang="en-US" smtClean="0"/>
-              <a:t>27-Feb-18</a:t>
+              <a:t>02-Mar-18</a:t>
             </a:fld>
             <a:endParaRPr lang="en-US"/>
           </a:p>
@@ -1835,7 +1861,7 @@
           <a:p>
             <a:fld id="{1231BFB6-14EA-4E35-8B8E-D28544ECD36E}" type="datetimeFigureOut">
               <a:rPr lang="en-US" smtClean="0"/>
-              <a:t>27-Feb-18</a:t>
+              <a:t>02-Mar-18</a:t>
             </a:fld>
             <a:endParaRPr lang="en-US"/>
           </a:p>
@@ -2112,7 +2138,7 @@
           <a:p>
             <a:fld id="{1231BFB6-14EA-4E35-8B8E-D28544ECD36E}" type="datetimeFigureOut">
               <a:rPr lang="en-US" smtClean="0"/>
-              <a:t>27-Feb-18</a:t>
+              <a:t>02-Mar-18</a:t>
             </a:fld>
             <a:endParaRPr lang="en-US"/>
           </a:p>
@@ -2365,7 +2391,7 @@
           <a:p>
             <a:fld id="{1231BFB6-14EA-4E35-8B8E-D28544ECD36E}" type="datetimeFigureOut">
               <a:rPr lang="en-US" smtClean="0"/>
-              <a:t>27-Feb-18</a:t>
+              <a:t>02-Mar-18</a:t>
             </a:fld>
             <a:endParaRPr lang="en-US"/>
           </a:p>
@@ -2578,7 +2604,7 @@
           <a:p>
             <a:fld id="{1231BFB6-14EA-4E35-8B8E-D28544ECD36E}" type="datetimeFigureOut">
               <a:rPr lang="en-US" smtClean="0"/>
-              <a:t>27-Feb-18</a:t>
+              <a:t>02-Mar-18</a:t>
             </a:fld>
             <a:endParaRPr lang="en-US"/>
           </a:p>
@@ -4140,7 +4166,7 @@
         <p:spPr>
           <a:xfrm>
             <a:off x="2609849" y="1414491"/>
-            <a:ext cx="593432" cy="307777"/>
+            <a:ext cx="675185" cy="307777"/>
           </a:xfrm>
           <a:prstGeom prst="rect">
             <a:avLst/>
@@ -4159,23 +4185,7 @@
                   <a:schemeClr val="accent1"/>
                 </a:solidFill>
               </a:rPr>
-              <a:t>(</a:t>
-            </a:r>
-            <a:r>
-              <a:rPr lang="en-US" sz="1400" dirty="0" err="1" smtClean="0">
-                <a:solidFill>
-                  <a:schemeClr val="accent1"/>
-                </a:solidFill>
-              </a:rPr>
-              <a:t>x,y,r</a:t>
-            </a:r>
-            <a:r>
-              <a:rPr lang="en-US" sz="1400" dirty="0" smtClean="0">
-                <a:solidFill>
-                  <a:schemeClr val="accent1"/>
-                </a:solidFill>
-              </a:rPr>
-              <a:t>)</a:t>
+              <a:t>(x, z, r)</a:t>
             </a:r>
             <a:endParaRPr lang="en-US" sz="1400" dirty="0">
               <a:solidFill>
@@ -4452,7 +4462,7 @@
         <p:spPr>
           <a:xfrm>
             <a:off x="2814760" y="3563243"/>
-            <a:ext cx="788999" cy="307777"/>
+            <a:ext cx="857927" cy="307777"/>
           </a:xfrm>
           <a:prstGeom prst="rect">
             <a:avLst/>
@@ -4471,7 +4481,7 @@
                   <a:schemeClr val="accent1"/>
                 </a:solidFill>
               </a:rPr>
-              <a:t>(x1,y1,r)</a:t>
+              <a:t>(x1, z1, r)</a:t>
             </a:r>
             <a:endParaRPr lang="en-US" sz="1400" dirty="0">
               <a:solidFill>
@@ -4642,7 +4652,7 @@
         <p:spPr>
           <a:xfrm>
             <a:off x="3812248" y="3886006"/>
-            <a:ext cx="681597" cy="307777"/>
+            <a:ext cx="710451" cy="307777"/>
           </a:xfrm>
           <a:prstGeom prst="rect">
             <a:avLst/>
@@ -4661,7 +4671,7 @@
                   <a:schemeClr val="accent1"/>
                 </a:solidFill>
               </a:rPr>
-              <a:t>(x2,y2)</a:t>
+              <a:t>(x2, z2)</a:t>
             </a:r>
             <a:endParaRPr lang="en-US" sz="1400" dirty="0">
               <a:solidFill>
@@ -4719,7 +4729,7 @@
         </p:nvSpPr>
         <p:spPr>
           <a:xfrm>
-            <a:off x="1413932" y="5451717"/>
+            <a:off x="1413932" y="5404582"/>
             <a:ext cx="3530600" cy="795866"/>
           </a:xfrm>
           <a:custGeom>
@@ -4900,7 +4910,7 @@
         </p:nvSpPr>
         <p:spPr>
           <a:xfrm>
-            <a:off x="2190751" y="5438775"/>
+            <a:off x="2190751" y="5391640"/>
             <a:ext cx="2533650" cy="1276350"/>
           </a:xfrm>
           <a:custGeom>
@@ -4995,8 +5005,8 @@
         </p:nvSpPr>
         <p:spPr>
           <a:xfrm>
-            <a:off x="2108265" y="5178693"/>
-            <a:ext cx="681597" cy="307777"/>
+            <a:off x="2108265" y="5131558"/>
+            <a:ext cx="710451" cy="307777"/>
           </a:xfrm>
           <a:prstGeom prst="rect">
             <a:avLst/>
@@ -5015,7 +5025,7 @@
                   <a:schemeClr val="accent1"/>
                 </a:solidFill>
               </a:rPr>
-              <a:t>(x1,y1)</a:t>
+              <a:t>(x1, z1)</a:t>
             </a:r>
             <a:endParaRPr lang="en-US" sz="1400" dirty="0">
               <a:solidFill>
@@ -5033,8 +5043,8 @@
         </p:nvSpPr>
         <p:spPr>
           <a:xfrm>
-            <a:off x="1629821" y="6091335"/>
-            <a:ext cx="681597" cy="307777"/>
+            <a:off x="1629821" y="6044200"/>
+            <a:ext cx="710451" cy="307777"/>
           </a:xfrm>
           <a:prstGeom prst="rect">
             <a:avLst/>
@@ -5053,7 +5063,7 @@
                   <a:schemeClr val="accent1"/>
                 </a:solidFill>
               </a:rPr>
-              <a:t>(x2,y2)</a:t>
+              <a:t>(x2, z2)</a:t>
             </a:r>
             <a:endParaRPr lang="en-US" sz="1400" dirty="0">
               <a:solidFill>
@@ -5071,8 +5081,8 @@
         </p:nvSpPr>
         <p:spPr>
           <a:xfrm>
-            <a:off x="4603733" y="5769173"/>
-            <a:ext cx="728084" cy="307777"/>
+            <a:off x="4603733" y="5722038"/>
+            <a:ext cx="716863" cy="307777"/>
           </a:xfrm>
           <a:prstGeom prst="rect">
             <a:avLst/>
@@ -5115,7 +5125,7 @@
                   <a:schemeClr val="accent1"/>
                 </a:solidFill>
               </a:rPr>
-              <a:t>yn</a:t>
+              <a:t>zn</a:t>
             </a:r>
             <a:r>
               <a:rPr lang="en-US" sz="1400" dirty="0" smtClean="0">
@@ -5141,7 +5151,7 @@
         </p:nvSpPr>
         <p:spPr>
           <a:xfrm>
-            <a:off x="3510486" y="6606293"/>
+            <a:off x="3510486" y="6559158"/>
             <a:ext cx="428322" cy="307777"/>
           </a:xfrm>
           <a:prstGeom prst="rect">
@@ -5166,6 +5176,727 @@
             <a:endParaRPr lang="en-US" sz="1400" dirty="0">
               <a:solidFill>
                 <a:schemeClr val="accent1"/>
+              </a:solidFill>
+            </a:endParaRPr>
+          </a:p>
+        </p:txBody>
+      </p:sp>
+      <p:sp>
+        <p:nvSpPr>
+          <p:cNvPr id="7" name="TextBox 6"/>
+          <p:cNvSpPr txBox="1"/>
+          <p:nvPr/>
+        </p:nvSpPr>
+        <p:spPr>
+          <a:xfrm>
+            <a:off x="6109771" y="1284229"/>
+            <a:ext cx="4049057" cy="646331"/>
+          </a:xfrm>
+          <a:prstGeom prst="rect">
+            <a:avLst/>
+          </a:prstGeom>
+          <a:noFill/>
+        </p:spPr>
+        <p:txBody>
+          <a:bodyPr wrap="none" rtlCol="0">
+            <a:spAutoFit/>
+          </a:bodyPr>
+          <a:lstStyle/>
+          <a:p>
+            <a:r>
+              <a:rPr lang="en-US" b="1" dirty="0" smtClean="0">
+                <a:solidFill>
+                  <a:schemeClr val="accent2">
+                    <a:lumMod val="50000"/>
+                  </a:schemeClr>
+                </a:solidFill>
+              </a:rPr>
+              <a:t>1:      </a:t>
+            </a:r>
+            <a:r>
+              <a:rPr lang="en-US" dirty="0" smtClean="0">
+                <a:solidFill>
+                  <a:schemeClr val="accent1">
+                    <a:lumMod val="75000"/>
+                  </a:schemeClr>
+                </a:solidFill>
+              </a:rPr>
+              <a:t>[[xa, za, ra]]</a:t>
+            </a:r>
+          </a:p>
+          <a:p>
+            <a:r>
+              <a:rPr lang="en-US" b="1" dirty="0" smtClean="0">
+                <a:solidFill>
+                  <a:schemeClr val="accent2">
+                    <a:lumMod val="50000"/>
+                  </a:schemeClr>
+                </a:solidFill>
+              </a:rPr>
+              <a:t>M</a:t>
+            </a:r>
+            <a:r>
+              <a:rPr lang="en-US" b="1" baseline="-25000" dirty="0" smtClean="0">
+                <a:solidFill>
+                  <a:schemeClr val="accent2">
+                    <a:lumMod val="50000"/>
+                  </a:schemeClr>
+                </a:solidFill>
+              </a:rPr>
+              <a:t>BF</a:t>
+            </a:r>
+            <a:r>
+              <a:rPr lang="en-US" b="1" dirty="0" smtClean="0">
+                <a:solidFill>
+                  <a:schemeClr val="accent2">
+                    <a:lumMod val="50000"/>
+                  </a:schemeClr>
+                </a:solidFill>
+              </a:rPr>
+              <a:t>: </a:t>
+            </a:r>
+            <a:r>
+              <a:rPr lang="en-US" dirty="0" smtClean="0">
+                <a:solidFill>
+                  <a:schemeClr val="accent1">
+                    <a:lumMod val="75000"/>
+                  </a:schemeClr>
+                </a:solidFill>
+              </a:rPr>
+              <a:t>[[xa, za, ra], [xb, zb, rb], [nx, nz, nr]]</a:t>
+            </a:r>
+            <a:endParaRPr lang="en-US" dirty="0">
+              <a:solidFill>
+                <a:schemeClr val="accent1">
+                  <a:lumMod val="75000"/>
+                </a:schemeClr>
+              </a:solidFill>
+            </a:endParaRPr>
+          </a:p>
+        </p:txBody>
+      </p:sp>
+      <p:sp>
+        <p:nvSpPr>
+          <p:cNvPr id="27" name="TextBox 26"/>
+          <p:cNvSpPr txBox="1"/>
+          <p:nvPr/>
+        </p:nvSpPr>
+        <p:spPr>
+          <a:xfrm>
+            <a:off x="6109771" y="2917985"/>
+            <a:ext cx="5322291" cy="1200329"/>
+          </a:xfrm>
+          <a:prstGeom prst="rect">
+            <a:avLst/>
+          </a:prstGeom>
+          <a:noFill/>
+        </p:spPr>
+        <p:txBody>
+          <a:bodyPr wrap="none" rtlCol="0">
+            <a:spAutoFit/>
+          </a:bodyPr>
+          <a:lstStyle/>
+          <a:p>
+            <a:r>
+              <a:rPr lang="en-US" b="1" dirty="0">
+                <a:solidFill>
+                  <a:schemeClr val="accent2">
+                    <a:lumMod val="50000"/>
+                  </a:schemeClr>
+                </a:solidFill>
+              </a:rPr>
+              <a:t>1</a:t>
+            </a:r>
+            <a:r>
+              <a:rPr lang="en-US" b="1" dirty="0" smtClean="0">
+                <a:solidFill>
+                  <a:schemeClr val="accent2">
+                    <a:lumMod val="50000"/>
+                  </a:schemeClr>
+                </a:solidFill>
+              </a:rPr>
+              <a:t>:      </a:t>
+            </a:r>
+            <a:r>
+              <a:rPr lang="en-US" dirty="0" smtClean="0">
+                <a:solidFill>
+                  <a:schemeClr val="accent1">
+                    <a:lumMod val="75000"/>
+                  </a:schemeClr>
+                </a:solidFill>
+              </a:rPr>
+              <a:t>[[x1a, z1a, r1a, x2a, z2a]]</a:t>
+            </a:r>
+          </a:p>
+          <a:p>
+            <a:r>
+              <a:rPr lang="en-US" b="1" dirty="0" smtClean="0">
+                <a:solidFill>
+                  <a:schemeClr val="accent2">
+                    <a:lumMod val="50000"/>
+                  </a:schemeClr>
+                </a:solidFill>
+              </a:rPr>
+              <a:t>M</a:t>
+            </a:r>
+            <a:r>
+              <a:rPr lang="en-US" b="1" baseline="-25000" dirty="0">
+                <a:solidFill>
+                  <a:schemeClr val="accent2">
+                    <a:lumMod val="50000"/>
+                  </a:schemeClr>
+                </a:solidFill>
+              </a:rPr>
+              <a:t>BF</a:t>
+            </a:r>
+            <a:r>
+              <a:rPr lang="en-US" b="1" dirty="0" smtClean="0">
+                <a:solidFill>
+                  <a:schemeClr val="accent2">
+                    <a:lumMod val="50000"/>
+                  </a:schemeClr>
+                </a:solidFill>
+              </a:rPr>
+              <a:t>: </a:t>
+            </a:r>
+            <a:r>
+              <a:rPr lang="en-US" dirty="0" smtClean="0">
+                <a:solidFill>
+                  <a:schemeClr val="accent1">
+                    <a:lumMod val="75000"/>
+                  </a:schemeClr>
+                </a:solidFill>
+              </a:rPr>
+              <a:t>[[x1a, z1a, r1a, x2a, z2a],</a:t>
+            </a:r>
+            <a:r>
+              <a:rPr lang="en-US" dirty="0">
+                <a:solidFill>
+                  <a:schemeClr val="accent1">
+                    <a:lumMod val="75000"/>
+                  </a:schemeClr>
+                </a:solidFill>
+              </a:rPr>
+              <a:t> [</a:t>
+            </a:r>
+            <a:r>
+              <a:rPr lang="en-US" dirty="0" smtClean="0">
+                <a:solidFill>
+                  <a:schemeClr val="accent1">
+                    <a:lumMod val="75000"/>
+                  </a:schemeClr>
+                </a:solidFill>
+              </a:rPr>
+              <a:t>x1b, z1b, r1b, x2b, z2b],</a:t>
+            </a:r>
+          </a:p>
+          <a:p>
+            <a:r>
+              <a:rPr lang="en-US" dirty="0">
+                <a:solidFill>
+                  <a:schemeClr val="accent1">
+                    <a:lumMod val="75000"/>
+                  </a:schemeClr>
+                </a:solidFill>
+              </a:rPr>
+              <a:t>	</a:t>
+            </a:r>
+            <a:r>
+              <a:rPr lang="en-US" dirty="0" smtClean="0">
+                <a:solidFill>
+                  <a:schemeClr val="accent1">
+                    <a:lumMod val="75000"/>
+                  </a:schemeClr>
+                </a:solidFill>
+              </a:rPr>
+              <a:t>	[nx1, nz1, nr1, nx2, nz2]]</a:t>
+            </a:r>
+          </a:p>
+          <a:p>
+            <a:r>
+              <a:rPr lang="en-US" b="1" dirty="0" smtClean="0">
+                <a:solidFill>
+                  <a:schemeClr val="accent2">
+                    <a:lumMod val="50000"/>
+                  </a:schemeClr>
+                </a:solidFill>
+              </a:rPr>
+              <a:t>M</a:t>
+            </a:r>
+            <a:r>
+              <a:rPr lang="en-US" b="1" baseline="-25000" dirty="0" smtClean="0">
+                <a:solidFill>
+                  <a:schemeClr val="accent2">
+                    <a:lumMod val="50000"/>
+                  </a:schemeClr>
+                </a:solidFill>
+              </a:rPr>
+              <a:t>APSO</a:t>
+            </a:r>
+            <a:r>
+              <a:rPr lang="en-US" b="1" dirty="0" smtClean="0">
+                <a:solidFill>
+                  <a:schemeClr val="accent2">
+                    <a:lumMod val="50000"/>
+                  </a:schemeClr>
+                </a:solidFill>
+              </a:rPr>
+              <a:t>: </a:t>
+            </a:r>
+            <a:r>
+              <a:rPr lang="en-US" dirty="0" smtClean="0">
+                <a:solidFill>
+                  <a:schemeClr val="accent1">
+                    <a:lumMod val="75000"/>
+                  </a:schemeClr>
+                </a:solidFill>
+              </a:rPr>
+              <a:t>¿?</a:t>
+            </a:r>
+            <a:endParaRPr lang="en-US" dirty="0">
+              <a:solidFill>
+                <a:schemeClr val="accent1">
+                  <a:lumMod val="75000"/>
+                </a:schemeClr>
+              </a:solidFill>
+            </a:endParaRPr>
+          </a:p>
+        </p:txBody>
+      </p:sp>
+      <p:sp>
+        <p:nvSpPr>
+          <p:cNvPr id="28" name="TextBox 27"/>
+          <p:cNvSpPr txBox="1"/>
+          <p:nvPr/>
+        </p:nvSpPr>
+        <p:spPr>
+          <a:xfrm>
+            <a:off x="6109771" y="4829486"/>
+            <a:ext cx="4681090" cy="1754326"/>
+          </a:xfrm>
+          <a:prstGeom prst="rect">
+            <a:avLst/>
+          </a:prstGeom>
+          <a:noFill/>
+        </p:spPr>
+        <p:txBody>
+          <a:bodyPr wrap="none" rtlCol="0">
+            <a:spAutoFit/>
+          </a:bodyPr>
+          <a:lstStyle/>
+          <a:p>
+            <a:r>
+              <a:rPr lang="en-US" b="1" dirty="0">
+                <a:solidFill>
+                  <a:schemeClr val="accent2">
+                    <a:lumMod val="50000"/>
+                  </a:schemeClr>
+                </a:solidFill>
+              </a:rPr>
+              <a:t>1</a:t>
+            </a:r>
+            <a:r>
+              <a:rPr lang="en-US" b="1" dirty="0" smtClean="0">
+                <a:solidFill>
+                  <a:schemeClr val="accent2">
+                    <a:lumMod val="50000"/>
+                  </a:schemeClr>
+                </a:solidFill>
+              </a:rPr>
+              <a:t>:      </a:t>
+            </a:r>
+            <a:r>
+              <a:rPr lang="en-US" dirty="0" smtClean="0">
+                <a:solidFill>
+                  <a:schemeClr val="accent1">
+                    <a:lumMod val="75000"/>
+                  </a:schemeClr>
+                </a:solidFill>
+              </a:rPr>
+              <a:t>[  [ [x1a, z1a], </a:t>
+            </a:r>
+            <a:r>
+              <a:rPr lang="en-US" dirty="0">
+                <a:solidFill>
+                  <a:schemeClr val="accent1">
+                    <a:lumMod val="75000"/>
+                  </a:schemeClr>
+                </a:solidFill>
+              </a:rPr>
+              <a:t>[</a:t>
+            </a:r>
+            <a:r>
+              <a:rPr lang="en-US" dirty="0" smtClean="0">
+                <a:solidFill>
+                  <a:schemeClr val="accent1">
+                    <a:lumMod val="75000"/>
+                  </a:schemeClr>
+                </a:solidFill>
+              </a:rPr>
+              <a:t>x2a</a:t>
+            </a:r>
+            <a:r>
+              <a:rPr lang="en-US" dirty="0">
+                <a:solidFill>
+                  <a:schemeClr val="accent1">
+                    <a:lumMod val="75000"/>
+                  </a:schemeClr>
+                </a:solidFill>
+              </a:rPr>
+              <a:t>, </a:t>
+            </a:r>
+            <a:r>
+              <a:rPr lang="en-US" dirty="0" smtClean="0">
+                <a:solidFill>
+                  <a:schemeClr val="accent1">
+                    <a:lumMod val="75000"/>
+                  </a:schemeClr>
+                </a:solidFill>
+              </a:rPr>
+              <a:t>z2a], … </a:t>
+            </a:r>
+            <a:r>
+              <a:rPr lang="en-US" dirty="0">
+                <a:solidFill>
+                  <a:schemeClr val="accent1">
+                    <a:lumMod val="75000"/>
+                  </a:schemeClr>
+                </a:solidFill>
+              </a:rPr>
+              <a:t>[</a:t>
+            </a:r>
+            <a:r>
+              <a:rPr lang="en-US" dirty="0" smtClean="0">
+                <a:solidFill>
+                  <a:schemeClr val="accent1">
+                    <a:lumMod val="75000"/>
+                  </a:schemeClr>
+                </a:solidFill>
+              </a:rPr>
+              <a:t>xna</a:t>
+            </a:r>
+            <a:r>
+              <a:rPr lang="en-US" dirty="0">
+                <a:solidFill>
+                  <a:schemeClr val="accent1">
+                    <a:lumMod val="75000"/>
+                  </a:schemeClr>
+                </a:solidFill>
+              </a:rPr>
+              <a:t>, </a:t>
+            </a:r>
+            <a:r>
+              <a:rPr lang="en-US" dirty="0" smtClean="0">
+                <a:solidFill>
+                  <a:schemeClr val="accent1">
+                    <a:lumMod val="75000"/>
+                  </a:schemeClr>
+                </a:solidFill>
+              </a:rPr>
+              <a:t>zna] ]  ]</a:t>
+            </a:r>
+          </a:p>
+          <a:p>
+            <a:r>
+              <a:rPr lang="en-US" b="1" dirty="0" smtClean="0">
+                <a:solidFill>
+                  <a:schemeClr val="accent2">
+                    <a:lumMod val="50000"/>
+                  </a:schemeClr>
+                </a:solidFill>
+              </a:rPr>
+              <a:t>M</a:t>
+            </a:r>
+            <a:r>
+              <a:rPr lang="en-US" b="1" baseline="-25000" dirty="0">
+                <a:solidFill>
+                  <a:schemeClr val="accent2">
+                    <a:lumMod val="50000"/>
+                  </a:schemeClr>
+                </a:solidFill>
+              </a:rPr>
+              <a:t>BF</a:t>
+            </a:r>
+            <a:r>
+              <a:rPr lang="en-US" b="1" dirty="0" smtClean="0">
+                <a:solidFill>
+                  <a:schemeClr val="accent2">
+                    <a:lumMod val="50000"/>
+                  </a:schemeClr>
+                </a:solidFill>
+              </a:rPr>
+              <a:t>: </a:t>
+            </a:r>
+            <a:r>
+              <a:rPr lang="en-US" dirty="0" smtClean="0">
+                <a:solidFill>
+                  <a:schemeClr val="accent1">
+                    <a:lumMod val="75000"/>
+                  </a:schemeClr>
+                </a:solidFill>
+              </a:rPr>
+              <a:t>[  [ [x1a, z1a], </a:t>
+            </a:r>
+            <a:r>
+              <a:rPr lang="en-US" dirty="0">
+                <a:solidFill>
+                  <a:schemeClr val="accent1">
+                    <a:lumMod val="75000"/>
+                  </a:schemeClr>
+                </a:solidFill>
+              </a:rPr>
+              <a:t>[</a:t>
+            </a:r>
+            <a:r>
+              <a:rPr lang="en-US" dirty="0" smtClean="0">
+                <a:solidFill>
+                  <a:schemeClr val="accent1">
+                    <a:lumMod val="75000"/>
+                  </a:schemeClr>
+                </a:solidFill>
+              </a:rPr>
+              <a:t>x2a, z2a], </a:t>
+            </a:r>
+            <a:r>
+              <a:rPr lang="en-US" dirty="0">
+                <a:solidFill>
+                  <a:schemeClr val="accent1">
+                    <a:lumMod val="75000"/>
+                  </a:schemeClr>
+                </a:solidFill>
+              </a:rPr>
+              <a:t>… [</a:t>
+            </a:r>
+            <a:r>
+              <a:rPr lang="en-US" dirty="0" smtClean="0">
+                <a:solidFill>
+                  <a:schemeClr val="accent1">
+                    <a:lumMod val="75000"/>
+                  </a:schemeClr>
+                </a:solidFill>
+              </a:rPr>
+              <a:t>xna, zna] ], </a:t>
+            </a:r>
+          </a:p>
+          <a:p>
+            <a:r>
+              <a:rPr lang="en-US" dirty="0">
+                <a:solidFill>
+                  <a:schemeClr val="accent1">
+                    <a:lumMod val="75000"/>
+                  </a:schemeClr>
+                </a:solidFill>
+              </a:rPr>
+              <a:t>	</a:t>
+            </a:r>
+            <a:r>
+              <a:rPr lang="en-US" dirty="0" smtClean="0">
+                <a:solidFill>
+                  <a:schemeClr val="accent1">
+                    <a:lumMod val="75000"/>
+                  </a:schemeClr>
+                </a:solidFill>
+              </a:rPr>
+              <a:t>[ [x1b, z1b], </a:t>
+            </a:r>
+            <a:r>
+              <a:rPr lang="en-US" dirty="0">
+                <a:solidFill>
+                  <a:schemeClr val="accent1">
+                    <a:lumMod val="75000"/>
+                  </a:schemeClr>
+                </a:solidFill>
+              </a:rPr>
+              <a:t>[</a:t>
+            </a:r>
+            <a:r>
+              <a:rPr lang="en-US" dirty="0" smtClean="0">
+                <a:solidFill>
+                  <a:schemeClr val="accent1">
+                    <a:lumMod val="75000"/>
+                  </a:schemeClr>
+                </a:solidFill>
+              </a:rPr>
+              <a:t>x2b, z2b], </a:t>
+            </a:r>
+            <a:r>
+              <a:rPr lang="en-US" dirty="0">
+                <a:solidFill>
+                  <a:schemeClr val="accent1">
+                    <a:lumMod val="75000"/>
+                  </a:schemeClr>
+                </a:solidFill>
+              </a:rPr>
+              <a:t>… [</a:t>
+            </a:r>
+            <a:r>
+              <a:rPr lang="en-US" dirty="0" smtClean="0">
+                <a:solidFill>
+                  <a:schemeClr val="accent1">
+                    <a:lumMod val="75000"/>
+                  </a:schemeClr>
+                </a:solidFill>
+              </a:rPr>
+              <a:t>xnb, znb] ],</a:t>
+            </a:r>
+          </a:p>
+          <a:p>
+            <a:r>
+              <a:rPr lang="en-US" dirty="0">
+                <a:solidFill>
+                  <a:schemeClr val="accent1">
+                    <a:lumMod val="75000"/>
+                  </a:schemeClr>
+                </a:solidFill>
+              </a:rPr>
+              <a:t>	</a:t>
+            </a:r>
+            <a:r>
+              <a:rPr lang="en-US" dirty="0" smtClean="0">
+                <a:solidFill>
+                  <a:schemeClr val="accent1">
+                    <a:lumMod val="75000"/>
+                  </a:schemeClr>
+                </a:solidFill>
+              </a:rPr>
+              <a:t>[ [nx, nz], </a:t>
+            </a:r>
+            <a:r>
+              <a:rPr lang="en-US" dirty="0">
+                <a:solidFill>
+                  <a:schemeClr val="accent1">
+                    <a:lumMod val="75000"/>
+                  </a:schemeClr>
+                </a:solidFill>
+              </a:rPr>
+              <a:t>[x2a, z2a], … [xna, zna</a:t>
+            </a:r>
+            <a:r>
+              <a:rPr lang="en-US" dirty="0" smtClean="0">
+                <a:solidFill>
+                  <a:schemeClr val="accent1">
+                    <a:lumMod val="75000"/>
+                  </a:schemeClr>
+                </a:solidFill>
+              </a:rPr>
+              <a:t>] ]  ]</a:t>
+            </a:r>
+          </a:p>
+          <a:p>
+            <a:r>
+              <a:rPr lang="en-US" b="1" dirty="0" smtClean="0">
+                <a:solidFill>
+                  <a:schemeClr val="accent2">
+                    <a:lumMod val="50000"/>
+                  </a:schemeClr>
+                </a:solidFill>
+              </a:rPr>
+              <a:t>M</a:t>
+            </a:r>
+            <a:r>
+              <a:rPr lang="en-US" b="1" baseline="-25000" dirty="0" smtClean="0">
+                <a:solidFill>
+                  <a:schemeClr val="accent2">
+                    <a:lumMod val="50000"/>
+                  </a:schemeClr>
+                </a:solidFill>
+              </a:rPr>
+              <a:t>GA+LM</a:t>
+            </a:r>
+            <a:r>
+              <a:rPr lang="en-US" b="1" dirty="0" smtClean="0">
+                <a:solidFill>
+                  <a:schemeClr val="accent2">
+                    <a:lumMod val="50000"/>
+                  </a:schemeClr>
+                </a:solidFill>
+              </a:rPr>
+              <a:t>: </a:t>
+            </a:r>
+            <a:r>
+              <a:rPr lang="en-US" dirty="0" smtClean="0">
+                <a:solidFill>
+                  <a:schemeClr val="accent1">
+                    <a:lumMod val="75000"/>
+                  </a:schemeClr>
+                </a:solidFill>
+              </a:rPr>
+              <a:t>[ [ [</a:t>
+            </a:r>
+            <a:r>
+              <a:rPr lang="en-US" dirty="0">
+                <a:solidFill>
+                  <a:schemeClr val="accent1">
+                    <a:lumMod val="75000"/>
+                  </a:schemeClr>
+                </a:solidFill>
+              </a:rPr>
+              <a:t>x1a, z1a], [x2a, z2a], … [xna, zna</a:t>
+            </a:r>
+            <a:r>
+              <a:rPr lang="en-US" dirty="0" smtClean="0">
+                <a:solidFill>
+                  <a:schemeClr val="accent1">
+                    <a:lumMod val="75000"/>
+                  </a:schemeClr>
+                </a:solidFill>
+              </a:rPr>
+              <a:t>] ], </a:t>
+            </a:r>
+            <a:endParaRPr lang="en-US" dirty="0">
+              <a:solidFill>
+                <a:schemeClr val="accent1">
+                  <a:lumMod val="75000"/>
+                </a:schemeClr>
+              </a:solidFill>
+            </a:endParaRPr>
+          </a:p>
+          <a:p>
+            <a:r>
+              <a:rPr lang="en-US" dirty="0">
+                <a:solidFill>
+                  <a:schemeClr val="accent1">
+                    <a:lumMod val="75000"/>
+                  </a:schemeClr>
+                </a:solidFill>
+              </a:rPr>
+              <a:t>	</a:t>
+            </a:r>
+            <a:r>
+              <a:rPr lang="en-US" dirty="0" smtClean="0">
+                <a:solidFill>
+                  <a:schemeClr val="accent1">
+                    <a:lumMod val="75000"/>
+                  </a:schemeClr>
+                </a:solidFill>
+              </a:rPr>
+              <a:t>[ [</a:t>
+            </a:r>
+            <a:r>
+              <a:rPr lang="en-US" dirty="0">
+                <a:solidFill>
+                  <a:schemeClr val="accent1">
+                    <a:lumMod val="75000"/>
+                  </a:schemeClr>
+                </a:solidFill>
+              </a:rPr>
+              <a:t>x1b, z1b], [x2b, z2b], … [xnb, znb</a:t>
+            </a:r>
+            <a:r>
+              <a:rPr lang="en-US" dirty="0" smtClean="0">
+                <a:solidFill>
+                  <a:schemeClr val="accent1">
+                    <a:lumMod val="75000"/>
+                  </a:schemeClr>
+                </a:solidFill>
+              </a:rPr>
+              <a:t>] ] ]</a:t>
+            </a:r>
+            <a:endParaRPr lang="en-US" dirty="0">
+              <a:solidFill>
+                <a:schemeClr val="accent1">
+                  <a:lumMod val="75000"/>
+                </a:schemeClr>
               </a:solidFill>
             </a:endParaRPr>
           </a:p>
@@ -5761,17 +6492,8 @@
             </a:pPr>
             <a:r>
               <a:rPr lang="nl-NL" sz="3600" b="1" dirty="0" smtClean="0"/>
-              <a:t>Most </a:t>
-            </a:r>
-            <a:r>
-              <a:rPr lang="nl-NL" sz="3600" b="1" dirty="0" smtClean="0"/>
-              <a:t>frequent </a:t>
-            </a:r>
-            <a:r>
-              <a:rPr lang="nl-NL" sz="3600" b="1" dirty="0" smtClean="0"/>
-              <a:t>cases (6):</a:t>
-            </a:r>
-            <a:endParaRPr lang="nl-NL" sz="3600" b="1" dirty="0" smtClean="0"/>
+              <a:t>Most frequent cases (6):</a:t>
+            </a:r>
           </a:p>
           <a:p>
             <a:r>
@@ -5784,11 +6506,7 @@
             </a:r>
             <a:r>
               <a:rPr lang="nl-NL" sz="3600" dirty="0" smtClean="0"/>
-              <a:t> </a:t>
-            </a:r>
-            <a:r>
-              <a:rPr lang="nl-NL" sz="3600" dirty="0" smtClean="0"/>
-              <a:t>  – </a:t>
+              <a:t>   – </a:t>
             </a:r>
             <a:r>
               <a:rPr lang="nl-NL" sz="3600" b="1" dirty="0" smtClean="0">

</xml_diff>